<commit_message>
ppt uploaded successfully pdf
</commit_message>
<xml_diff>
--- a/04_presentaion/our_ppt_presentaion_internal_hackathon.pptx
+++ b/04_presentaion/our_ppt_presentaion_internal_hackathon.pptx
@@ -144,7 +144,7 @@
   </p:defaultTextStyle>
   <p:extLst>
     <p:ext uri="{EFAFB233-063F-42B5-8137-9DF3F51BA10A}">
-      <p15:sldGuideLst xmlns:p15="http://schemas.microsoft.com/office/powerpoint/2012/main" xmlns="">
+      <p15:sldGuideLst xmlns="" xmlns:p15="http://schemas.microsoft.com/office/powerpoint/2012/main">
         <p15:guide id="1" orient="horz" pos="2160" userDrawn="1">
           <p15:clr>
             <a:srgbClr val="A4A3A4"/>
@@ -449,7 +449,7 @@
     </p:spTree>
     <p:extLst>
       <p:ext uri="{BB962C8B-B14F-4D97-AF65-F5344CB8AC3E}">
-        <p14:creationId xmlns:p14="http://schemas.microsoft.com/office/powerpoint/2010/main" xmlns="" val="235749454"/>
+        <p14:creationId xmlns="" xmlns:p14="http://schemas.microsoft.com/office/powerpoint/2010/main" val="235749454"/>
       </p:ext>
     </p:extLst>
   </p:cSld>
@@ -688,7 +688,7 @@
     </p:spTree>
     <p:extLst>
       <p:ext uri="{BB962C8B-B14F-4D97-AF65-F5344CB8AC3E}">
-        <p14:creationId xmlns:p14="http://schemas.microsoft.com/office/powerpoint/2010/main" xmlns="" val="2904073229"/>
+        <p14:creationId xmlns="" xmlns:p14="http://schemas.microsoft.com/office/powerpoint/2010/main" val="2904073229"/>
       </p:ext>
     </p:extLst>
   </p:cSld>
@@ -807,7 +807,7 @@
     </p:spTree>
     <p:extLst>
       <p:ext uri="{BB962C8B-B14F-4D97-AF65-F5344CB8AC3E}">
-        <p14:creationId xmlns:p14="http://schemas.microsoft.com/office/powerpoint/2010/main" xmlns="" val="2335206292"/>
+        <p14:creationId xmlns="" xmlns:p14="http://schemas.microsoft.com/office/powerpoint/2010/main" val="2335206292"/>
       </p:ext>
     </p:extLst>
   </p:cSld>
@@ -985,7 +985,7 @@
     </p:spTree>
     <p:extLst>
       <p:ext uri="{BB962C8B-B14F-4D97-AF65-F5344CB8AC3E}">
-        <p14:creationId xmlns:p14="http://schemas.microsoft.com/office/powerpoint/2010/main" xmlns="" val="3773505461"/>
+        <p14:creationId xmlns="" xmlns:p14="http://schemas.microsoft.com/office/powerpoint/2010/main" val="3773505461"/>
       </p:ext>
     </p:extLst>
   </p:cSld>
@@ -1163,7 +1163,7 @@
     </p:spTree>
     <p:extLst>
       <p:ext uri="{BB962C8B-B14F-4D97-AF65-F5344CB8AC3E}">
-        <p14:creationId xmlns:p14="http://schemas.microsoft.com/office/powerpoint/2010/main" xmlns="" val="2641722845"/>
+        <p14:creationId xmlns="" xmlns:p14="http://schemas.microsoft.com/office/powerpoint/2010/main" val="2641722845"/>
       </p:ext>
     </p:extLst>
   </p:cSld>
@@ -1341,7 +1341,7 @@
     </p:spTree>
     <p:extLst>
       <p:ext uri="{BB962C8B-B14F-4D97-AF65-F5344CB8AC3E}">
-        <p14:creationId xmlns:p14="http://schemas.microsoft.com/office/powerpoint/2010/main" xmlns="" val="1908672725"/>
+        <p14:creationId xmlns="" xmlns:p14="http://schemas.microsoft.com/office/powerpoint/2010/main" val="1908672725"/>
       </p:ext>
     </p:extLst>
   </p:cSld>
@@ -4682,10 +4682,10 @@
           <p:cNvPr id="36" name="Rectangle 24">
             <a:extLst>
               <a:ext uri="{FF2B5EF4-FFF2-40B4-BE49-F238E27FC236}">
-                <a16:creationId xmlns:a16="http://schemas.microsoft.com/office/drawing/2014/main" xmlns="" id="{3E443FD7-A66B-4AA0-872D-B088B9BC5F17}"/>
+                <a16:creationId xmlns="" xmlns:a16="http://schemas.microsoft.com/office/drawing/2014/main" id="{3E443FD7-A66B-4AA0-872D-B088B9BC5F17}"/>
               </a:ext>
               <a:ext uri="{C183D7F6-B498-43B3-948B-1728B52AA6E4}">
-                <adec:decorative xmlns="" xmlns:adec="http://schemas.microsoft.com/office/drawing/2017/decorative" val="1"/>
+                <adec:decorative xmlns:adec="http://schemas.microsoft.com/office/drawing/2017/decorative" xmlns="" val="1"/>
               </a:ext>
             </a:extLst>
           </p:cNvPr>
@@ -4695,7 +4695,7 @@
           <p:nvPr>
             <p:extLst>
               <p:ext uri="{386F3935-93C4-4BCD-93E2-E3B085C9AB24}">
-                <p16:designElem xmlns:p16="http://schemas.microsoft.com/office/powerpoint/2015/main" xmlns="" val="1"/>
+                <p16:designElem xmlns="" xmlns:p16="http://schemas.microsoft.com/office/powerpoint/2015/main" val="1"/>
               </p:ext>
             </p:extLst>
           </p:nvPr>
@@ -4742,10 +4742,10 @@
           <p:cNvPr id="37" name="Freeform: Shape 26">
             <a:extLst>
               <a:ext uri="{FF2B5EF4-FFF2-40B4-BE49-F238E27FC236}">
-                <a16:creationId xmlns:a16="http://schemas.microsoft.com/office/drawing/2014/main" xmlns="" id="{C04BE0EF-3561-49B4-9A29-F283168A91C7}"/>
+                <a16:creationId xmlns="" xmlns:a16="http://schemas.microsoft.com/office/drawing/2014/main" id="{C04BE0EF-3561-49B4-9A29-F283168A91C7}"/>
               </a:ext>
               <a:ext uri="{C183D7F6-B498-43B3-948B-1728B52AA6E4}">
-                <adec:decorative xmlns="" xmlns:adec="http://schemas.microsoft.com/office/drawing/2017/decorative" val="1"/>
+                <adec:decorative xmlns:adec="http://schemas.microsoft.com/office/drawing/2017/decorative" xmlns="" val="1"/>
               </a:ext>
             </a:extLst>
           </p:cNvPr>
@@ -4755,7 +4755,7 @@
           <p:nvPr>
             <p:extLst>
               <p:ext uri="{386F3935-93C4-4BCD-93E2-E3B085C9AB24}">
-                <p16:designElem xmlns:p16="http://schemas.microsoft.com/office/powerpoint/2015/main" xmlns="" val="1"/>
+                <p16:designElem xmlns="" xmlns:p16="http://schemas.microsoft.com/office/powerpoint/2015/main" val="1"/>
               </p:ext>
             </p:extLst>
           </p:nvPr>
@@ -5516,7 +5516,7 @@
           <p:cNvPr id="5" name="Picture 4">
             <a:extLst>
               <a:ext uri="{FF2B5EF4-FFF2-40B4-BE49-F238E27FC236}">
-                <a16:creationId xmlns:a16="http://schemas.microsoft.com/office/drawing/2014/main" xmlns="" id="{9120848B-B2B4-45BE-A961-AEC0B06CF41B}"/>
+                <a16:creationId xmlns="" xmlns:a16="http://schemas.microsoft.com/office/drawing/2014/main" id="{9120848B-B2B4-45BE-A961-AEC0B06CF41B}"/>
               </a:ext>
             </a:extLst>
           </p:cNvPr>
@@ -5711,19 +5711,8 @@
                 <a:latin typeface="Arial" pitchFamily="34" charset="0"/>
                 <a:cs typeface="Arial" pitchFamily="34" charset="0"/>
               </a:rPr>
-              <a:t>Theme - </a:t>
-            </a:r>
-            <a:r>
-              <a:rPr lang="en-US" sz="2400" b="1" dirty="0" smtClean="0">
-                <a:latin typeface="Arial" pitchFamily="34" charset="0"/>
-                <a:cs typeface="Arial" pitchFamily="34" charset="0"/>
-              </a:rPr>
-              <a:t>Smart Automation</a:t>
-            </a:r>
-            <a:endParaRPr lang="en-US" sz="2400" b="1" dirty="0" smtClean="0">
-              <a:latin typeface="Arial" pitchFamily="34" charset="0"/>
-              <a:cs typeface="Arial" pitchFamily="34" charset="0"/>
-            </a:endParaRPr>
+              <a:t>Theme - Smart Automation</a:t>
+            </a:r>
           </a:p>
           <a:p>
             <a:pPr marL="285750" indent="-285750" algn="just">
@@ -6051,17 +6040,20 @@
                 <a:latin typeface="Arial" pitchFamily="34" charset="0"/>
                 <a:cs typeface="Arial" pitchFamily="34" charset="0"/>
               </a:rPr>
-              <a:t>Image Recognition </a:t>
-            </a:r>
-            <a:r>
-              <a:rPr lang="en-US" sz="1600" b="1" dirty="0" smtClean="0">
+              <a:t>Image Recognition Module :</a:t>
+            </a:r>
+          </a:p>
+          <a:p>
+            <a:pPr marL="342900" indent="-342900"/>
+            <a:r>
+              <a:rPr lang="en-US" sz="1600" dirty="0" smtClean="0">
                 <a:solidFill>
                   <a:schemeClr val="tx2"/>
                 </a:solidFill>
                 <a:latin typeface="Arial" pitchFamily="34" charset="0"/>
                 <a:cs typeface="Arial" pitchFamily="34" charset="0"/>
               </a:rPr>
-              <a:t>Module :</a:t>
+              <a:t>	- Utilize deep learning-based computer vision (CNN, RNN, etc.) to recognize objects in images</a:t>
             </a:r>
           </a:p>
           <a:p>
@@ -6074,50 +6066,7 @@
                 <a:latin typeface="Arial" pitchFamily="34" charset="0"/>
                 <a:cs typeface="Arial" pitchFamily="34" charset="0"/>
               </a:rPr>
-              <a:t>	- Utilize </a:t>
-            </a:r>
-            <a:r>
-              <a:rPr lang="en-US" sz="1600" dirty="0" smtClean="0">
-                <a:solidFill>
-                  <a:schemeClr val="tx2"/>
-                </a:solidFill>
-                <a:latin typeface="Arial" pitchFamily="34" charset="0"/>
-                <a:cs typeface="Arial" pitchFamily="34" charset="0"/>
-              </a:rPr>
-              <a:t>deep learning-based computer vision (CNN, RNN, etc.) to recognize objects in </a:t>
-            </a:r>
-            <a:r>
-              <a:rPr lang="en-US" sz="1600" dirty="0" smtClean="0">
-                <a:solidFill>
-                  <a:schemeClr val="tx2"/>
-                </a:solidFill>
-                <a:latin typeface="Arial" pitchFamily="34" charset="0"/>
-                <a:cs typeface="Arial" pitchFamily="34" charset="0"/>
-              </a:rPr>
-              <a:t>images</a:t>
-            </a:r>
-          </a:p>
-          <a:p>
-            <a:pPr marL="342900" indent="-342900"/>
-            <a:r>
-              <a:rPr lang="en-US" sz="1600" dirty="0" smtClean="0">
-                <a:solidFill>
-                  <a:schemeClr val="tx2"/>
-                </a:solidFill>
-                <a:latin typeface="Arial" pitchFamily="34" charset="0"/>
-                <a:cs typeface="Arial" pitchFamily="34" charset="0"/>
-              </a:rPr>
-              <a:t>	-	Train </a:t>
-            </a:r>
-            <a:r>
-              <a:rPr lang="en-US" sz="1600" dirty="0" smtClean="0">
-                <a:solidFill>
-                  <a:schemeClr val="tx2"/>
-                </a:solidFill>
-                <a:latin typeface="Arial" pitchFamily="34" charset="0"/>
-                <a:cs typeface="Arial" pitchFamily="34" charset="0"/>
-              </a:rPr>
-              <a:t>models using </a:t>
+              <a:t>	-	Train models using </a:t>
             </a:r>
             <a:r>
               <a:rPr lang="en-US" sz="1600" dirty="0" err="1" smtClean="0">
@@ -6163,8 +6112,11 @@
                 <a:latin typeface="Arial" pitchFamily="34" charset="0"/>
                 <a:cs typeface="Arial" pitchFamily="34" charset="0"/>
               </a:rPr>
-              <a:t>	- </a:t>
-            </a:r>
+              <a:t>	- Employ NLP techniques (tokenization, entity recognition, sentiment analysis, etc.) to understand user queries</a:t>
+            </a:r>
+          </a:p>
+          <a:p>
+            <a:pPr marL="342900" indent="-342900"/>
             <a:r>
               <a:rPr lang="en-US" sz="1600" dirty="0" smtClean="0">
                 <a:solidFill>
@@ -6173,50 +6125,7 @@
                 <a:latin typeface="Arial" pitchFamily="34" charset="0"/>
                 <a:cs typeface="Arial" pitchFamily="34" charset="0"/>
               </a:rPr>
-              <a:t>Employ NLP techniques (tokenization, entity recognition, sentiment analysis, etc.) to understand user </a:t>
-            </a:r>
-            <a:r>
-              <a:rPr lang="en-US" sz="1600" dirty="0" smtClean="0">
-                <a:solidFill>
-                  <a:schemeClr val="tx2"/>
-                </a:solidFill>
-                <a:latin typeface="Arial" pitchFamily="34" charset="0"/>
-                <a:cs typeface="Arial" pitchFamily="34" charset="0"/>
-              </a:rPr>
-              <a:t>queries</a:t>
-            </a:r>
-          </a:p>
-          <a:p>
-            <a:pPr marL="342900" indent="-342900"/>
-            <a:r>
-              <a:rPr lang="en-US" sz="1600" dirty="0" smtClean="0">
-                <a:solidFill>
-                  <a:schemeClr val="tx2"/>
-                </a:solidFill>
-                <a:latin typeface="Arial" pitchFamily="34" charset="0"/>
-                <a:cs typeface="Arial" pitchFamily="34" charset="0"/>
-              </a:rPr>
-              <a:t>	- </a:t>
-            </a:r>
-            <a:r>
-              <a:rPr lang="en-US" sz="1600" dirty="0" smtClean="0">
-                <a:solidFill>
-                  <a:schemeClr val="tx2"/>
-                </a:solidFill>
-                <a:latin typeface="Arial" pitchFamily="34" charset="0"/>
-                <a:cs typeface="Arial" pitchFamily="34" charset="0"/>
-              </a:rPr>
-              <a:t>Integrate with Image Recognition Module to generate relevant </a:t>
-            </a:r>
-            <a:r>
-              <a:rPr lang="en-US" sz="1600" dirty="0" smtClean="0">
-                <a:solidFill>
-                  <a:schemeClr val="tx2"/>
-                </a:solidFill>
-                <a:latin typeface="Arial" pitchFamily="34" charset="0"/>
-                <a:cs typeface="Arial" pitchFamily="34" charset="0"/>
-              </a:rPr>
-              <a:t>responses</a:t>
+              <a:t>	- Integrate with Image Recognition Module to generate relevant responses</a:t>
             </a:r>
           </a:p>
           <a:p>
@@ -6255,7 +6164,17 @@
                 <a:latin typeface="Arial" pitchFamily="34" charset="0"/>
                 <a:cs typeface="Arial" pitchFamily="34" charset="0"/>
               </a:rPr>
-              <a:t>- </a:t>
+              <a:t>- Design conversational interface using </a:t>
+            </a:r>
+            <a:r>
+              <a:rPr lang="en-US" sz="1600" dirty="0" err="1" smtClean="0">
+                <a:solidFill>
+                  <a:schemeClr val="tx2"/>
+                </a:solidFill>
+                <a:latin typeface="Arial" pitchFamily="34" charset="0"/>
+                <a:cs typeface="Arial" pitchFamily="34" charset="0"/>
+              </a:rPr>
+              <a:t>Django</a:t>
             </a:r>
             <a:r>
               <a:rPr lang="en-US" sz="1600" dirty="0" smtClean="0">
@@ -6265,37 +6184,7 @@
                 <a:latin typeface="Arial" pitchFamily="34" charset="0"/>
                 <a:cs typeface="Arial" pitchFamily="34" charset="0"/>
               </a:rPr>
-              <a:t>Design conversational interface using </a:t>
-            </a:r>
-            <a:r>
-              <a:rPr lang="en-US" sz="1600" dirty="0" err="1" smtClean="0">
-                <a:solidFill>
-                  <a:schemeClr val="tx2"/>
-                </a:solidFill>
-                <a:latin typeface="Arial" pitchFamily="34" charset="0"/>
-                <a:cs typeface="Arial" pitchFamily="34" charset="0"/>
-              </a:rPr>
-              <a:t>Django</a:t>
-            </a:r>
-            <a:r>
-              <a:rPr lang="en-US" sz="1600" dirty="0" smtClean="0">
-                <a:solidFill>
-                  <a:schemeClr val="tx2"/>
-                </a:solidFill>
-                <a:latin typeface="Arial" pitchFamily="34" charset="0"/>
-                <a:cs typeface="Arial" pitchFamily="34" charset="0"/>
-              </a:rPr>
-              <a:t> and JavaScript- Integrate Image Recognition and NLP Modules to </a:t>
-            </a:r>
-            <a:r>
-              <a:rPr lang="en-US" sz="1600" dirty="0" smtClean="0">
-                <a:solidFill>
-                  <a:schemeClr val="tx2"/>
-                </a:solidFill>
-                <a:latin typeface="Arial" pitchFamily="34" charset="0"/>
-                <a:cs typeface="Arial" pitchFamily="34" charset="0"/>
-              </a:rPr>
-              <a:t>generate responses</a:t>
+              <a:t> and JavaScript- Integrate Image Recognition and NLP Modules to generate responses</a:t>
             </a:r>
           </a:p>
           <a:p>
@@ -6324,7 +6213,17 @@
                 <a:latin typeface="Arial" pitchFamily="34" charset="0"/>
                 <a:cs typeface="Arial" pitchFamily="34" charset="0"/>
               </a:rPr>
-              <a:t>	- </a:t>
+              <a:t>	- Store user queries, image recognition results, and </a:t>
+            </a:r>
+            <a:r>
+              <a:rPr lang="en-US" sz="1600" dirty="0" err="1" smtClean="0">
+                <a:solidFill>
+                  <a:schemeClr val="tx2"/>
+                </a:solidFill>
+                <a:latin typeface="Arial" pitchFamily="34" charset="0"/>
+                <a:cs typeface="Arial" pitchFamily="34" charset="0"/>
+              </a:rPr>
+              <a:t>chatbot</a:t>
             </a:r>
             <a:r>
               <a:rPr lang="en-US" sz="1600" dirty="0" smtClean="0">
@@ -6334,60 +6233,20 @@
                 <a:latin typeface="Arial" pitchFamily="34" charset="0"/>
                 <a:cs typeface="Arial" pitchFamily="34" charset="0"/>
               </a:rPr>
-              <a:t>Store user queries, image recognition results, and </a:t>
-            </a:r>
-            <a:r>
-              <a:rPr lang="en-US" sz="1600" dirty="0" err="1" smtClean="0">
+              <a:t> responses</a:t>
+            </a:r>
+          </a:p>
+          <a:p>
+            <a:pPr marL="342900" indent="-342900"/>
+            <a:r>
+              <a:rPr lang="en-US" sz="1600" dirty="0" smtClean="0">
                 <a:solidFill>
                   <a:schemeClr val="tx2"/>
                 </a:solidFill>
                 <a:latin typeface="Arial" pitchFamily="34" charset="0"/>
                 <a:cs typeface="Arial" pitchFamily="34" charset="0"/>
               </a:rPr>
-              <a:t>chatbot</a:t>
-            </a:r>
-            <a:r>
-              <a:rPr lang="en-US" sz="1600" dirty="0" smtClean="0">
-                <a:solidFill>
-                  <a:schemeClr val="tx2"/>
-                </a:solidFill>
-                <a:latin typeface="Arial" pitchFamily="34" charset="0"/>
-                <a:cs typeface="Arial" pitchFamily="34" charset="0"/>
-              </a:rPr>
-              <a:t> </a:t>
-            </a:r>
-            <a:r>
-              <a:rPr lang="en-US" sz="1600" dirty="0" smtClean="0">
-                <a:solidFill>
-                  <a:schemeClr val="tx2"/>
-                </a:solidFill>
-                <a:latin typeface="Arial" pitchFamily="34" charset="0"/>
-                <a:cs typeface="Arial" pitchFamily="34" charset="0"/>
-              </a:rPr>
-              <a:t>responses</a:t>
-            </a:r>
-          </a:p>
-          <a:p>
-            <a:pPr marL="342900" indent="-342900"/>
-            <a:r>
-              <a:rPr lang="en-US" sz="1600" dirty="0" smtClean="0">
-                <a:solidFill>
-                  <a:schemeClr val="tx2"/>
-                </a:solidFill>
-                <a:latin typeface="Arial" pitchFamily="34" charset="0"/>
-                <a:cs typeface="Arial" pitchFamily="34" charset="0"/>
-              </a:rPr>
-              <a:t>	- </a:t>
-            </a:r>
-            <a:r>
-              <a:rPr lang="en-US" sz="1600" dirty="0" smtClean="0">
-                <a:solidFill>
-                  <a:schemeClr val="tx2"/>
-                </a:solidFill>
-                <a:latin typeface="Arial" pitchFamily="34" charset="0"/>
-                <a:cs typeface="Arial" pitchFamily="34" charset="0"/>
-              </a:rPr>
-              <a:t>Use database to improve </a:t>
+              <a:t>	- Use database to improve </a:t>
             </a:r>
             <a:r>
               <a:rPr lang="en-US" sz="1600" dirty="0" err="1" smtClean="0">
@@ -6490,10 +6349,10 @@
           <p:cNvPr id="10" name="Oval 9" descr="Your startup LOGO">
             <a:extLst>
               <a:ext uri="{FF2B5EF4-FFF2-40B4-BE49-F238E27FC236}">
-                <a16:creationId xmlns:a16="http://schemas.microsoft.com/office/drawing/2014/main" xmlns="" id="{5DBCE864-823D-4A13-9607-5DA1F0ED5FB8}"/>
+                <a16:creationId xmlns="" xmlns:a16="http://schemas.microsoft.com/office/drawing/2014/main" id="{5DBCE864-823D-4A13-9607-5DA1F0ED5FB8}"/>
               </a:ext>
               <a:ext uri="{C183D7F6-B498-43B3-948B-1728B52AA6E4}">
-                <adec:decorative xmlns="" xmlns:adec="http://schemas.microsoft.com/office/drawing/2017/decorative" val="0"/>
+                <adec:decorative xmlns:adec="http://schemas.microsoft.com/office/drawing/2017/decorative" xmlns="" val="0"/>
               </a:ext>
             </a:extLst>
           </p:cNvPr>
@@ -6600,7 +6459,7 @@
           <p:cNvPr id="10" name="Rectangle 9">
             <a:extLst>
               <a:ext uri="{FF2B5EF4-FFF2-40B4-BE49-F238E27FC236}">
-                <a16:creationId xmlns:a16="http://schemas.microsoft.com/office/drawing/2014/main" xmlns="" id="{AD4F69D3-EEB0-4C4C-9434-B9960FB5854C}"/>
+                <a16:creationId xmlns="" xmlns:a16="http://schemas.microsoft.com/office/drawing/2014/main" id="{AD4F69D3-EEB0-4C4C-9434-B9960FB5854C}"/>
               </a:ext>
             </a:extLst>
           </p:cNvPr>
@@ -6725,14 +6584,7 @@
                 <a:latin typeface="Arial" pitchFamily="34" charset="0"/>
                 <a:cs typeface="Arial" pitchFamily="34" charset="0"/>
               </a:rPr>
-              <a:t>1. Image Recognition </a:t>
-            </a:r>
-            <a:r>
-              <a:rPr lang="en-US" sz="1400" b="1" dirty="0" smtClean="0">
-                <a:latin typeface="Arial" pitchFamily="34" charset="0"/>
-                <a:cs typeface="Arial" pitchFamily="34" charset="0"/>
-              </a:rPr>
-              <a:t>Module</a:t>
+              <a:t>1. Image Recognition Module</a:t>
             </a:r>
           </a:p>
           <a:p>
@@ -6742,56 +6594,21 @@
                 <a:latin typeface="Arial" pitchFamily="34" charset="0"/>
                 <a:cs typeface="Arial" pitchFamily="34" charset="0"/>
               </a:rPr>
-              <a:t>- </a:t>
+              <a:t>- Use CNNs (</a:t>
+            </a:r>
+            <a:r>
+              <a:rPr lang="en-US" sz="1400" dirty="0" err="1" smtClean="0">
+                <a:latin typeface="Arial" pitchFamily="34" charset="0"/>
+                <a:cs typeface="Arial" pitchFamily="34" charset="0"/>
+              </a:rPr>
+              <a:t>ImageNet</a:t>
             </a:r>
             <a:r>
               <a:rPr lang="en-US" sz="1400" dirty="0" smtClean="0">
                 <a:latin typeface="Arial" pitchFamily="34" charset="0"/>
                 <a:cs typeface="Arial" pitchFamily="34" charset="0"/>
               </a:rPr>
-              <a:t>Use CNNs </a:t>
-            </a:r>
-            <a:r>
-              <a:rPr lang="en-US" sz="1400" dirty="0" smtClean="0">
-                <a:latin typeface="Arial" pitchFamily="34" charset="0"/>
-                <a:cs typeface="Arial" pitchFamily="34" charset="0"/>
-              </a:rPr>
-              <a:t>(</a:t>
-            </a:r>
-            <a:r>
-              <a:rPr lang="en-US" sz="1400" dirty="0" err="1" smtClean="0">
-                <a:latin typeface="Arial" pitchFamily="34" charset="0"/>
-                <a:cs typeface="Arial" pitchFamily="34" charset="0"/>
-              </a:rPr>
-              <a:t>ImageNet</a:t>
-            </a:r>
-            <a:r>
-              <a:rPr lang="en-US" sz="1400" dirty="0" smtClean="0">
-                <a:latin typeface="Arial" pitchFamily="34" charset="0"/>
-                <a:cs typeface="Arial" pitchFamily="34" charset="0"/>
-              </a:rPr>
-              <a:t> </a:t>
-            </a:r>
-            <a:r>
-              <a:rPr lang="en-US" sz="1400" dirty="0" smtClean="0">
-                <a:latin typeface="Arial" pitchFamily="34" charset="0"/>
-                <a:cs typeface="Arial" pitchFamily="34" charset="0"/>
-              </a:rPr>
-              <a:t>) </a:t>
-            </a:r>
-            <a:r>
-              <a:rPr lang="en-US" sz="1400" dirty="0" smtClean="0">
-                <a:latin typeface="Arial" pitchFamily="34" charset="0"/>
-                <a:cs typeface="Arial" pitchFamily="34" charset="0"/>
-              </a:rPr>
-              <a:t>for object detection and </a:t>
-            </a:r>
-            <a:r>
-              <a:rPr lang="en-US" sz="1400" dirty="0" smtClean="0">
-                <a:latin typeface="Arial" pitchFamily="34" charset="0"/>
-                <a:cs typeface="Arial" pitchFamily="34" charset="0"/>
-              </a:rPr>
-              <a:t>recognition customer supporting </a:t>
+              <a:t> ) for object detection and recognition customer supporting </a:t>
             </a:r>
             <a:r>
               <a:rPr lang="en-US" sz="1400" dirty="0" err="1" smtClean="0">
@@ -6828,54 +6645,70 @@
               </a:rPr>
               <a:t> agents will be activated and they will started to reply it </a:t>
             </a:r>
+          </a:p>
+          <a:p>
+            <a:pPr marL="800100" lvl="1" indent="-342900" algn="just"/>
+            <a:r>
+              <a:rPr lang="en-US" sz="1400" dirty="0" smtClean="0">
+                <a:latin typeface="Arial" pitchFamily="34" charset="0"/>
+                <a:cs typeface="Arial" pitchFamily="34" charset="0"/>
+              </a:rPr>
+              <a:t>- framework: </a:t>
+            </a:r>
+            <a:r>
+              <a:rPr lang="en-US" sz="1400" dirty="0" err="1" smtClean="0">
+                <a:latin typeface="Arial" pitchFamily="34" charset="0"/>
+                <a:cs typeface="Arial" pitchFamily="34" charset="0"/>
+              </a:rPr>
+              <a:t>PyTorch</a:t>
+            </a:r>
+            <a:r>
+              <a:rPr lang="en-US" sz="1400" dirty="0" smtClean="0">
+                <a:latin typeface="Arial" pitchFamily="34" charset="0"/>
+                <a:cs typeface="Arial" pitchFamily="34" charset="0"/>
+              </a:rPr>
+              <a:t>- Image Processing:, </a:t>
+            </a:r>
+            <a:r>
+              <a:rPr lang="en-US" sz="1400" dirty="0" err="1" smtClean="0">
+                <a:latin typeface="Arial" pitchFamily="34" charset="0"/>
+                <a:cs typeface="Arial" pitchFamily="34" charset="0"/>
+              </a:rPr>
+              <a:t>OpenCV</a:t>
+            </a:r>
             <a:endParaRPr lang="en-US" sz="1400" dirty="0" smtClean="0">
               <a:latin typeface="Arial" pitchFamily="34" charset="0"/>
               <a:cs typeface="Arial" pitchFamily="34" charset="0"/>
             </a:endParaRPr>
           </a:p>
           <a:p>
+            <a:pPr marL="342900" indent="-342900" algn="just">
+              <a:buFont typeface="Arial" panose="020B0604020202020204" pitchFamily="34" charset="0"/>
+              <a:buChar char="•"/>
+            </a:pPr>
+            <a:r>
+              <a:rPr lang="en-US" sz="1400" b="1" dirty="0" smtClean="0">
+                <a:latin typeface="Arial" pitchFamily="34" charset="0"/>
+                <a:cs typeface="Arial" pitchFamily="34" charset="0"/>
+              </a:rPr>
+              <a:t>2. NLP Module</a:t>
+            </a:r>
+          </a:p>
+          <a:p>
             <a:pPr marL="800100" lvl="1" indent="-342900" algn="just"/>
             <a:r>
               <a:rPr lang="en-US" sz="1400" dirty="0" smtClean="0">
                 <a:latin typeface="Arial" pitchFamily="34" charset="0"/>
                 <a:cs typeface="Arial" pitchFamily="34" charset="0"/>
               </a:rPr>
-              <a:t>- framework</a:t>
-            </a:r>
-            <a:r>
-              <a:rPr lang="en-US" sz="1400" dirty="0" smtClean="0">
-                <a:latin typeface="Arial" pitchFamily="34" charset="0"/>
-                <a:cs typeface="Arial" pitchFamily="34" charset="0"/>
-              </a:rPr>
-              <a:t>: </a:t>
+              <a:t>- Text Processing: NLTK for Sentiment Analysis and give customer support according uploaded image and asked </a:t>
             </a:r>
             <a:r>
               <a:rPr lang="en-US" sz="1400" dirty="0" err="1" smtClean="0">
                 <a:latin typeface="Arial" pitchFamily="34" charset="0"/>
                 <a:cs typeface="Arial" pitchFamily="34" charset="0"/>
               </a:rPr>
-              <a:t>PyTorch</a:t>
-            </a:r>
-            <a:r>
-              <a:rPr lang="en-US" sz="1400" dirty="0" smtClean="0">
-                <a:latin typeface="Arial" pitchFamily="34" charset="0"/>
-                <a:cs typeface="Arial" pitchFamily="34" charset="0"/>
-              </a:rPr>
-              <a:t>- Image Processing</a:t>
-            </a:r>
-            <a:r>
-              <a:rPr lang="en-US" sz="1400" dirty="0" smtClean="0">
-                <a:latin typeface="Arial" pitchFamily="34" charset="0"/>
-                <a:cs typeface="Arial" pitchFamily="34" charset="0"/>
-              </a:rPr>
-              <a:t>:, </a:t>
-            </a:r>
-            <a:r>
-              <a:rPr lang="en-US" sz="1400" dirty="0" err="1" smtClean="0">
-                <a:latin typeface="Arial" pitchFamily="34" charset="0"/>
-                <a:cs typeface="Arial" pitchFamily="34" charset="0"/>
-              </a:rPr>
-              <a:t>OpenCV</a:t>
+              <a:t>quesrtions</a:t>
             </a:r>
             <a:endParaRPr lang="en-US" sz="1400" dirty="0" smtClean="0">
               <a:latin typeface="Arial" pitchFamily="34" charset="0"/>
@@ -6883,6 +6716,16 @@
             </a:endParaRPr>
           </a:p>
           <a:p>
+            <a:pPr marL="800100" lvl="1" indent="-342900" algn="just"/>
+            <a:r>
+              <a:rPr lang="en-US" sz="1400" dirty="0" smtClean="0">
+                <a:latin typeface="Arial" pitchFamily="34" charset="0"/>
+                <a:cs typeface="Arial" pitchFamily="34" charset="0"/>
+              </a:rPr>
+              <a:t>- Text-Image Correlation: similarity metrics (cosine similarity)</a:t>
+            </a:r>
+          </a:p>
+          <a:p>
             <a:pPr marL="342900" indent="-342900" algn="just">
               <a:buFont typeface="Arial" panose="020B0604020202020204" pitchFamily="34" charset="0"/>
               <a:buChar char="•"/>
@@ -6892,21 +6735,21 @@
                 <a:latin typeface="Arial" pitchFamily="34" charset="0"/>
                 <a:cs typeface="Arial" pitchFamily="34" charset="0"/>
               </a:rPr>
-              <a:t>2</a:t>
+              <a:t>3. </a:t>
+            </a:r>
+            <a:r>
+              <a:rPr lang="en-US" sz="1400" b="1" dirty="0" err="1" smtClean="0">
+                <a:latin typeface="Arial" pitchFamily="34" charset="0"/>
+                <a:cs typeface="Arial" pitchFamily="34" charset="0"/>
+              </a:rPr>
+              <a:t>Chatbot</a:t>
             </a:r>
             <a:r>
               <a:rPr lang="en-US" sz="1400" b="1" dirty="0" smtClean="0">
                 <a:latin typeface="Arial" pitchFamily="34" charset="0"/>
                 <a:cs typeface="Arial" pitchFamily="34" charset="0"/>
               </a:rPr>
-              <a:t>. NLP </a:t>
-            </a:r>
-            <a:r>
-              <a:rPr lang="en-US" sz="1400" b="1" dirty="0" smtClean="0">
-                <a:latin typeface="Arial" pitchFamily="34" charset="0"/>
-                <a:cs typeface="Arial" pitchFamily="34" charset="0"/>
-              </a:rPr>
-              <a:t>Module</a:t>
+              <a:t> Module</a:t>
             </a:r>
           </a:p>
           <a:p>
@@ -6916,84 +6759,45 @@
                 <a:latin typeface="Arial" pitchFamily="34" charset="0"/>
                 <a:cs typeface="Arial" pitchFamily="34" charset="0"/>
               </a:rPr>
-              <a:t>- </a:t>
+              <a:t>- Frontend: React- Backend: </a:t>
+            </a:r>
+            <a:r>
+              <a:rPr lang="en-US" sz="1400" dirty="0" err="1" smtClean="0">
+                <a:latin typeface="Arial" pitchFamily="34" charset="0"/>
+                <a:cs typeface="Arial" pitchFamily="34" charset="0"/>
+              </a:rPr>
+              <a:t>Django</a:t>
             </a:r>
             <a:r>
               <a:rPr lang="en-US" sz="1400" dirty="0" smtClean="0">
                 <a:latin typeface="Arial" pitchFamily="34" charset="0"/>
                 <a:cs typeface="Arial" pitchFamily="34" charset="0"/>
               </a:rPr>
-              <a:t>Text Processing: NLTK </a:t>
+              <a:t>, </a:t>
+            </a:r>
+            <a:r>
+              <a:rPr lang="en-US" sz="1400" dirty="0" err="1" smtClean="0">
+                <a:latin typeface="Arial" pitchFamily="34" charset="0"/>
+                <a:cs typeface="Arial" pitchFamily="34" charset="0"/>
+              </a:rPr>
+              <a:t>Django</a:t>
             </a:r>
             <a:r>
               <a:rPr lang="en-US" sz="1400" dirty="0" smtClean="0">
                 <a:latin typeface="Arial" pitchFamily="34" charset="0"/>
                 <a:cs typeface="Arial" pitchFamily="34" charset="0"/>
               </a:rPr>
-              <a:t>for </a:t>
-            </a:r>
+              <a:t> REST Framework</a:t>
+            </a:r>
+          </a:p>
+          <a:p>
+            <a:pPr marL="800100" lvl="1" indent="-342900" algn="just"/>
             <a:r>
               <a:rPr lang="en-US" sz="1400" dirty="0" smtClean="0">
                 <a:latin typeface="Arial" pitchFamily="34" charset="0"/>
                 <a:cs typeface="Arial" pitchFamily="34" charset="0"/>
               </a:rPr>
-              <a:t>Sentiment Analysis and </a:t>
-            </a:r>
-            <a:r>
-              <a:rPr lang="en-US" sz="1400" dirty="0" smtClean="0">
-                <a:latin typeface="Arial" pitchFamily="34" charset="0"/>
-                <a:cs typeface="Arial" pitchFamily="34" charset="0"/>
-              </a:rPr>
-              <a:t>give customer </a:t>
-            </a:r>
-            <a:r>
-              <a:rPr lang="en-US" sz="1400" dirty="0" smtClean="0">
-                <a:latin typeface="Arial" pitchFamily="34" charset="0"/>
-                <a:cs typeface="Arial" pitchFamily="34" charset="0"/>
-              </a:rPr>
-              <a:t>s</a:t>
-            </a:r>
-            <a:r>
-              <a:rPr lang="en-US" sz="1400" dirty="0" smtClean="0">
-                <a:latin typeface="Arial" pitchFamily="34" charset="0"/>
-                <a:cs typeface="Arial" pitchFamily="34" charset="0"/>
-              </a:rPr>
-              <a:t>upport according uploaded image and asked </a:t>
-            </a:r>
-            <a:r>
-              <a:rPr lang="en-US" sz="1400" dirty="0" err="1" smtClean="0">
-                <a:latin typeface="Arial" pitchFamily="34" charset="0"/>
-                <a:cs typeface="Arial" pitchFamily="34" charset="0"/>
-              </a:rPr>
-              <a:t>quesrtions</a:t>
-            </a:r>
-            <a:endParaRPr lang="en-US" sz="1400" dirty="0" smtClean="0">
-              <a:latin typeface="Arial" pitchFamily="34" charset="0"/>
-              <a:cs typeface="Arial" pitchFamily="34" charset="0"/>
-            </a:endParaRPr>
-          </a:p>
-          <a:p>
-            <a:pPr marL="800100" lvl="1" indent="-342900" algn="just"/>
-            <a:r>
-              <a:rPr lang="en-US" sz="1400" dirty="0" smtClean="0">
-                <a:latin typeface="Arial" pitchFamily="34" charset="0"/>
-                <a:cs typeface="Arial" pitchFamily="34" charset="0"/>
-              </a:rPr>
-              <a:t>- </a:t>
-            </a:r>
-            <a:r>
-              <a:rPr lang="en-US" sz="1400" dirty="0" smtClean="0">
-                <a:latin typeface="Arial" pitchFamily="34" charset="0"/>
-                <a:cs typeface="Arial" pitchFamily="34" charset="0"/>
-              </a:rPr>
-              <a:t>Text-Image Correlation: similarity metrics (cosine similarity</a:t>
-            </a:r>
-            <a:r>
-              <a:rPr lang="en-US" sz="1400" dirty="0" smtClean="0">
-                <a:latin typeface="Arial" pitchFamily="34" charset="0"/>
-                <a:cs typeface="Arial" pitchFamily="34" charset="0"/>
-              </a:rPr>
-              <a:t>)</a:t>
+              <a:t>- APIs integrate image recognition and NLP modules</a:t>
             </a:r>
           </a:p>
           <a:p>
@@ -7002,39 +6806,11 @@
               <a:buChar char="•"/>
             </a:pPr>
             <a:r>
-              <a:rPr lang="en-US" sz="1400" b="1" dirty="0" smtClean="0">
-                <a:latin typeface="Arial" pitchFamily="34" charset="0"/>
-                <a:cs typeface="Arial" pitchFamily="34" charset="0"/>
-              </a:rPr>
-              <a:t>3</a:t>
-            </a:r>
-            <a:r>
-              <a:rPr lang="en-US" sz="1400" b="1" dirty="0" smtClean="0">
-                <a:latin typeface="Arial" pitchFamily="34" charset="0"/>
-                <a:cs typeface="Arial" pitchFamily="34" charset="0"/>
-              </a:rPr>
-              <a:t>. </a:t>
-            </a:r>
-            <a:r>
-              <a:rPr lang="en-US" sz="1400" b="1" dirty="0" err="1" smtClean="0">
-                <a:latin typeface="Arial" pitchFamily="34" charset="0"/>
-                <a:cs typeface="Arial" pitchFamily="34" charset="0"/>
-              </a:rPr>
-              <a:t>Chatbot</a:t>
-            </a:r>
-            <a:r>
-              <a:rPr lang="en-US" sz="1400" b="1" dirty="0" smtClean="0">
-                <a:latin typeface="Arial" pitchFamily="34" charset="0"/>
-                <a:cs typeface="Arial" pitchFamily="34" charset="0"/>
-              </a:rPr>
-              <a:t> </a:t>
-            </a:r>
-            <a:r>
-              <a:rPr lang="en-US" sz="1400" b="1" dirty="0" smtClean="0">
-                <a:latin typeface="Arial" pitchFamily="34" charset="0"/>
-                <a:cs typeface="Arial" pitchFamily="34" charset="0"/>
-              </a:rPr>
-              <a:t>Module</a:t>
+              <a:rPr lang="en-US" sz="1400" dirty="0" smtClean="0">
+                <a:latin typeface="Arial" pitchFamily="34" charset="0"/>
+                <a:cs typeface="Arial" pitchFamily="34" charset="0"/>
+              </a:rPr>
+              <a:t>4. Database-</a:t>
             </a:r>
           </a:p>
           <a:p>
@@ -7044,193 +6820,55 @@
                 <a:latin typeface="Arial" pitchFamily="34" charset="0"/>
                 <a:cs typeface="Arial" pitchFamily="34" charset="0"/>
               </a:rPr>
-              <a:t>- </a:t>
+              <a:t>- Relational Database (SQLITE/</a:t>
+            </a:r>
+            <a:r>
+              <a:rPr lang="en-US" sz="1400" dirty="0" err="1" smtClean="0">
+                <a:latin typeface="Arial" pitchFamily="34" charset="0"/>
+                <a:cs typeface="Arial" pitchFamily="34" charset="0"/>
+              </a:rPr>
+              <a:t>MySQL</a:t>
             </a:r>
             <a:r>
               <a:rPr lang="en-US" sz="1400" dirty="0" smtClean="0">
                 <a:latin typeface="Arial" pitchFamily="34" charset="0"/>
                 <a:cs typeface="Arial" pitchFamily="34" charset="0"/>
               </a:rPr>
-              <a:t>Frontend: React- Backend: </a:t>
+              <a:t>)</a:t>
+            </a:r>
+          </a:p>
+          <a:p>
+            <a:pPr marL="800100" lvl="1" indent="-342900" algn="just"/>
+            <a:r>
+              <a:rPr lang="en-US" sz="1400" dirty="0" smtClean="0">
+                <a:latin typeface="Arial" pitchFamily="34" charset="0"/>
+                <a:cs typeface="Arial" pitchFamily="34" charset="0"/>
+              </a:rPr>
+              <a:t>- Store user queries, recognized objects, and </a:t>
             </a:r>
             <a:r>
               <a:rPr lang="en-US" sz="1400" dirty="0" err="1" smtClean="0">
                 <a:latin typeface="Arial" pitchFamily="34" charset="0"/>
                 <a:cs typeface="Arial" pitchFamily="34" charset="0"/>
               </a:rPr>
-              <a:t>Django</a:t>
+              <a:t>chatbot</a:t>
             </a:r>
             <a:r>
               <a:rPr lang="en-US" sz="1400" dirty="0" smtClean="0">
                 <a:latin typeface="Arial" pitchFamily="34" charset="0"/>
                 <a:cs typeface="Arial" pitchFamily="34" charset="0"/>
               </a:rPr>
-              <a:t>, </a:t>
-            </a:r>
-            <a:r>
-              <a:rPr lang="en-US" sz="1400" dirty="0" err="1" smtClean="0">
-                <a:latin typeface="Arial" pitchFamily="34" charset="0"/>
-                <a:cs typeface="Arial" pitchFamily="34" charset="0"/>
-              </a:rPr>
-              <a:t>Django</a:t>
-            </a:r>
+              <a:t> responses</a:t>
+            </a:r>
+          </a:p>
+          <a:p>
+            <a:pPr marL="800100" lvl="1" indent="-342900" algn="just"/>
             <a:r>
               <a:rPr lang="en-US" sz="1400" dirty="0" smtClean="0">
                 <a:latin typeface="Arial" pitchFamily="34" charset="0"/>
                 <a:cs typeface="Arial" pitchFamily="34" charset="0"/>
               </a:rPr>
-              <a:t> REST </a:t>
-            </a:r>
-            <a:r>
-              <a:rPr lang="en-US" sz="1400" dirty="0" smtClean="0">
-                <a:latin typeface="Arial" pitchFamily="34" charset="0"/>
-                <a:cs typeface="Arial" pitchFamily="34" charset="0"/>
-              </a:rPr>
-              <a:t>Framework</a:t>
-            </a:r>
-          </a:p>
-          <a:p>
-            <a:pPr marL="800100" lvl="1" indent="-342900" algn="just"/>
-            <a:r>
-              <a:rPr lang="en-US" sz="1400" dirty="0" smtClean="0">
-                <a:latin typeface="Arial" pitchFamily="34" charset="0"/>
-                <a:cs typeface="Arial" pitchFamily="34" charset="0"/>
-              </a:rPr>
-              <a:t>- </a:t>
-            </a:r>
-            <a:r>
-              <a:rPr lang="en-US" sz="1400" dirty="0" smtClean="0">
-                <a:latin typeface="Arial" pitchFamily="34" charset="0"/>
-                <a:cs typeface="Arial" pitchFamily="34" charset="0"/>
-              </a:rPr>
-              <a:t>APIs integrate image recognition and NLP </a:t>
-            </a:r>
-            <a:r>
-              <a:rPr lang="en-US" sz="1400" dirty="0" smtClean="0">
-                <a:latin typeface="Arial" pitchFamily="34" charset="0"/>
-                <a:cs typeface="Arial" pitchFamily="34" charset="0"/>
-              </a:rPr>
-              <a:t>modules</a:t>
-            </a:r>
-          </a:p>
-          <a:p>
-            <a:pPr marL="342900" indent="-342900" algn="just">
-              <a:buFont typeface="Arial" panose="020B0604020202020204" pitchFamily="34" charset="0"/>
-              <a:buChar char="•"/>
-            </a:pPr>
-            <a:r>
-              <a:rPr lang="en-US" sz="1400" dirty="0" smtClean="0">
-                <a:latin typeface="Arial" pitchFamily="34" charset="0"/>
-                <a:cs typeface="Arial" pitchFamily="34" charset="0"/>
-              </a:rPr>
-              <a:t>4</a:t>
-            </a:r>
-            <a:r>
-              <a:rPr lang="en-US" sz="1400" dirty="0" smtClean="0">
-                <a:latin typeface="Arial" pitchFamily="34" charset="0"/>
-                <a:cs typeface="Arial" pitchFamily="34" charset="0"/>
-              </a:rPr>
-              <a:t>. </a:t>
-            </a:r>
-            <a:r>
-              <a:rPr lang="en-US" sz="1400" dirty="0" smtClean="0">
-                <a:latin typeface="Arial" pitchFamily="34" charset="0"/>
-                <a:cs typeface="Arial" pitchFamily="34" charset="0"/>
-              </a:rPr>
-              <a:t>Database-</a:t>
-            </a:r>
-          </a:p>
-          <a:p>
-            <a:pPr marL="800100" lvl="1" indent="-342900" algn="just"/>
-            <a:r>
-              <a:rPr lang="en-US" sz="1400" dirty="0" smtClean="0">
-                <a:latin typeface="Arial" pitchFamily="34" charset="0"/>
-                <a:cs typeface="Arial" pitchFamily="34" charset="0"/>
-              </a:rPr>
-              <a:t>- Relational </a:t>
-            </a:r>
-            <a:r>
-              <a:rPr lang="en-US" sz="1400" dirty="0" smtClean="0">
-                <a:latin typeface="Arial" pitchFamily="34" charset="0"/>
-                <a:cs typeface="Arial" pitchFamily="34" charset="0"/>
-              </a:rPr>
-              <a:t>Database </a:t>
-            </a:r>
-            <a:r>
-              <a:rPr lang="en-US" sz="1400" dirty="0" smtClean="0">
-                <a:latin typeface="Arial" pitchFamily="34" charset="0"/>
-                <a:cs typeface="Arial" pitchFamily="34" charset="0"/>
-              </a:rPr>
-              <a:t>(SQLITE/</a:t>
-            </a:r>
-            <a:r>
-              <a:rPr lang="en-US" sz="1400" dirty="0" err="1" smtClean="0">
-                <a:latin typeface="Arial" pitchFamily="34" charset="0"/>
-                <a:cs typeface="Arial" pitchFamily="34" charset="0"/>
-              </a:rPr>
-              <a:t>MySQL</a:t>
-            </a:r>
-            <a:r>
-              <a:rPr lang="en-US" sz="1400" dirty="0" smtClean="0">
-                <a:latin typeface="Arial" pitchFamily="34" charset="0"/>
-                <a:cs typeface="Arial" pitchFamily="34" charset="0"/>
-              </a:rPr>
-              <a:t>)</a:t>
-            </a:r>
-          </a:p>
-          <a:p>
-            <a:pPr marL="800100" lvl="1" indent="-342900" algn="just"/>
-            <a:r>
-              <a:rPr lang="en-US" sz="1400" dirty="0" smtClean="0">
-                <a:latin typeface="Arial" pitchFamily="34" charset="0"/>
-                <a:cs typeface="Arial" pitchFamily="34" charset="0"/>
-              </a:rPr>
-              <a:t>- </a:t>
-            </a:r>
-            <a:r>
-              <a:rPr lang="en-US" sz="1400" dirty="0" smtClean="0">
-                <a:latin typeface="Arial" pitchFamily="34" charset="0"/>
-                <a:cs typeface="Arial" pitchFamily="34" charset="0"/>
-              </a:rPr>
-              <a:t>Store user queries, recognized objects, and </a:t>
-            </a:r>
-            <a:r>
-              <a:rPr lang="en-US" sz="1400" dirty="0" err="1" smtClean="0">
-                <a:latin typeface="Arial" pitchFamily="34" charset="0"/>
-                <a:cs typeface="Arial" pitchFamily="34" charset="0"/>
-              </a:rPr>
-              <a:t>chatbot</a:t>
-            </a:r>
-            <a:r>
-              <a:rPr lang="en-US" sz="1400" dirty="0" smtClean="0">
-                <a:latin typeface="Arial" pitchFamily="34" charset="0"/>
-                <a:cs typeface="Arial" pitchFamily="34" charset="0"/>
-              </a:rPr>
-              <a:t> </a:t>
-            </a:r>
-            <a:r>
-              <a:rPr lang="en-US" sz="1400" dirty="0" smtClean="0">
-                <a:latin typeface="Arial" pitchFamily="34" charset="0"/>
-                <a:cs typeface="Arial" pitchFamily="34" charset="0"/>
-              </a:rPr>
-              <a:t>responses</a:t>
-            </a:r>
-          </a:p>
-          <a:p>
-            <a:pPr marL="800100" lvl="1" indent="-342900" algn="just"/>
-            <a:r>
-              <a:rPr lang="en-US" sz="1400" dirty="0" smtClean="0">
-                <a:latin typeface="Arial" pitchFamily="34" charset="0"/>
-                <a:cs typeface="Arial" pitchFamily="34" charset="0"/>
-              </a:rPr>
-              <a:t>- </a:t>
-            </a:r>
-            <a:r>
-              <a:rPr lang="en-US" sz="1400" dirty="0" smtClean="0">
-                <a:latin typeface="Arial" pitchFamily="34" charset="0"/>
-                <a:cs typeface="Arial" pitchFamily="34" charset="0"/>
-              </a:rPr>
-              <a:t>Continuously improve accuracy through feedback loops</a:t>
+              <a:t>- Continuously improve accuracy through feedback loops</a:t>
             </a:r>
             <a:endParaRPr lang="en-US" sz="1400" dirty="0">
               <a:latin typeface="Arial" pitchFamily="34" charset="0"/>
@@ -7342,10 +6980,10 @@
           <p:cNvPr id="11" name="Oval 10" descr="Your startup LOGO">
             <a:extLst>
               <a:ext uri="{FF2B5EF4-FFF2-40B4-BE49-F238E27FC236}">
-                <a16:creationId xmlns:a16="http://schemas.microsoft.com/office/drawing/2014/main" xmlns="" id="{5DBCE864-823D-4A13-9607-5DA1F0ED5FB8}"/>
+                <a16:creationId xmlns="" xmlns:a16="http://schemas.microsoft.com/office/drawing/2014/main" id="{5DBCE864-823D-4A13-9607-5DA1F0ED5FB8}"/>
               </a:ext>
               <a:ext uri="{C183D7F6-B498-43B3-948B-1728B52AA6E4}">
-                <adec:decorative xmlns="" xmlns:adec="http://schemas.microsoft.com/office/drawing/2017/decorative" val="0"/>
+                <adec:decorative xmlns:adec="http://schemas.microsoft.com/office/drawing/2017/decorative" xmlns="" val="0"/>
               </a:ext>
             </a:extLst>
           </p:cNvPr>
@@ -7425,7 +7063,7 @@
           <p:cNvPr id="10" name="Rectangle 9">
             <a:extLst>
               <a:ext uri="{FF2B5EF4-FFF2-40B4-BE49-F238E27FC236}">
-                <a16:creationId xmlns:a16="http://schemas.microsoft.com/office/drawing/2014/main" xmlns="" id="{AD4F69D3-EEB0-4C4C-9434-B9960FB5854C}"/>
+                <a16:creationId xmlns="" xmlns:a16="http://schemas.microsoft.com/office/drawing/2014/main" id="{AD4F69D3-EEB0-4C4C-9434-B9960FB5854C}"/>
               </a:ext>
             </a:extLst>
           </p:cNvPr>
@@ -7594,14 +7232,7 @@
                 <a:latin typeface="Arial" pitchFamily="34" charset="0"/>
                 <a:cs typeface="Arial" pitchFamily="34" charset="0"/>
               </a:rPr>
-              <a:t>₹1,16,000 - ₹</a:t>
-            </a:r>
-            <a:r>
-              <a:rPr lang="en-US" sz="2000" b="1" dirty="0" smtClean="0">
-                <a:latin typeface="Arial" pitchFamily="34" charset="0"/>
-                <a:cs typeface="Arial" pitchFamily="34" charset="0"/>
-              </a:rPr>
-              <a:t>1,77,000)</a:t>
+              <a:t>₹1,16,000 - ₹1,77,000)</a:t>
             </a:r>
             <a:endParaRPr lang="en-US" sz="2000" b="1" dirty="0" smtClean="0">
               <a:solidFill>
@@ -7832,10 +7463,10 @@
           <p:cNvPr id="12" name="Oval 11" descr="Your startup LOGO">
             <a:extLst>
               <a:ext uri="{FF2B5EF4-FFF2-40B4-BE49-F238E27FC236}">
-                <a16:creationId xmlns:a16="http://schemas.microsoft.com/office/drawing/2014/main" xmlns="" id="{5DBCE864-823D-4A13-9607-5DA1F0ED5FB8}"/>
+                <a16:creationId xmlns="" xmlns:a16="http://schemas.microsoft.com/office/drawing/2014/main" id="{5DBCE864-823D-4A13-9607-5DA1F0ED5FB8}"/>
               </a:ext>
               <a:ext uri="{C183D7F6-B498-43B3-948B-1728B52AA6E4}">
-                <adec:decorative xmlns="" xmlns:adec="http://schemas.microsoft.com/office/drawing/2017/decorative" val="0"/>
+                <adec:decorative xmlns:adec="http://schemas.microsoft.com/office/drawing/2017/decorative" xmlns="" val="0"/>
               </a:ext>
             </a:extLst>
           </p:cNvPr>
@@ -7945,14 +7576,7 @@
                 <a:latin typeface="Arial" pitchFamily="34" charset="0"/>
                 <a:cs typeface="Arial" pitchFamily="34" charset="0"/>
               </a:rPr>
-              <a:t> plan with </a:t>
-            </a:r>
-            <a:r>
-              <a:rPr lang="en-US" sz="2000" b="1" dirty="0" smtClean="0">
-                <a:latin typeface="Arial" pitchFamily="34" charset="0"/>
-                <a:cs typeface="Arial" pitchFamily="34" charset="0"/>
-              </a:rPr>
-              <a:t>our solution : (</a:t>
+              <a:t> plan with our solution : (</a:t>
             </a:r>
             <a:r>
               <a:rPr lang="en-US" sz="2000" b="1" dirty="0" smtClean="0">
@@ -8064,7 +7688,7 @@
     </p:spTree>
     <p:extLst>
       <p:ext uri="{BB962C8B-B14F-4D97-AF65-F5344CB8AC3E}">
-        <p14:creationId xmlns:p14="http://schemas.microsoft.com/office/powerpoint/2010/main" xmlns="" val="3753387913"/>
+        <p14:creationId xmlns="" xmlns:p14="http://schemas.microsoft.com/office/powerpoint/2010/main" val="3753387913"/>
       </p:ext>
     </p:extLst>
   </p:cSld>
@@ -8103,7 +7727,7 @@
           <p:cNvPr id="10" name="Rectangle 9">
             <a:extLst>
               <a:ext uri="{FF2B5EF4-FFF2-40B4-BE49-F238E27FC236}">
-                <a16:creationId xmlns:a16="http://schemas.microsoft.com/office/drawing/2014/main" xmlns="" id="{AD4F69D3-EEB0-4C4C-9434-B9960FB5854C}"/>
+                <a16:creationId xmlns="" xmlns:a16="http://schemas.microsoft.com/office/drawing/2014/main" id="{AD4F69D3-EEB0-4C4C-9434-B9960FB5854C}"/>
               </a:ext>
             </a:extLst>
           </p:cNvPr>
@@ -8247,27 +7871,7 @@
                 <a:latin typeface="Arial" pitchFamily="34" charset="0"/>
                 <a:cs typeface="Arial" pitchFamily="34" charset="0"/>
               </a:rPr>
-              <a:t>Benefits </a:t>
-            </a:r>
-            <a:r>
-              <a:rPr lang="en-US" b="1" dirty="0" smtClean="0">
-                <a:solidFill>
-                  <a:prstClr val="black"/>
-                </a:solidFill>
-                <a:latin typeface="Arial" pitchFamily="34" charset="0"/>
-                <a:cs typeface="Arial" pitchFamily="34" charset="0"/>
-              </a:rPr>
-              <a:t>for </a:t>
-            </a:r>
-            <a:r>
-              <a:rPr lang="en-US" b="1" dirty="0" smtClean="0">
-                <a:solidFill>
-                  <a:prstClr val="black"/>
-                </a:solidFill>
-                <a:latin typeface="Arial" pitchFamily="34" charset="0"/>
-                <a:cs typeface="Arial" pitchFamily="34" charset="0"/>
-              </a:rPr>
-              <a:t>BEL1 : </a:t>
+              <a:t>Benefits for BEL1 : </a:t>
             </a:r>
             <a:r>
               <a:rPr lang="en-US" sz="1600" dirty="0" smtClean="0">
@@ -8292,7 +7896,17 @@
                 <a:latin typeface="Arial" pitchFamily="34" charset="0"/>
                 <a:cs typeface="Arial" pitchFamily="34" charset="0"/>
               </a:rPr>
-              <a:t>	</a:t>
+              <a:t>	- </a:t>
+            </a:r>
+            <a:r>
+              <a:rPr lang="en-US" sz="1600" b="1" dirty="0" smtClean="0">
+                <a:solidFill>
+                  <a:prstClr val="black"/>
+                </a:solidFill>
+                <a:latin typeface="Arial" pitchFamily="34" charset="0"/>
+                <a:cs typeface="Arial" pitchFamily="34" charset="0"/>
+              </a:rPr>
+              <a:t>Streamlined Operations:</a:t>
             </a:r>
             <a:r>
               <a:rPr lang="en-US" sz="1600" dirty="0" smtClean="0">
@@ -8302,47 +7916,7 @@
                 <a:latin typeface="Arial" pitchFamily="34" charset="0"/>
                 <a:cs typeface="Arial" pitchFamily="34" charset="0"/>
               </a:rPr>
-              <a:t>- </a:t>
-            </a:r>
-            <a:r>
-              <a:rPr lang="en-US" sz="1600" b="1" dirty="0" smtClean="0">
-                <a:solidFill>
-                  <a:prstClr val="black"/>
-                </a:solidFill>
-                <a:latin typeface="Arial" pitchFamily="34" charset="0"/>
-                <a:cs typeface="Arial" pitchFamily="34" charset="0"/>
-              </a:rPr>
-              <a:t>Streamlined </a:t>
-            </a:r>
-            <a:r>
-              <a:rPr lang="en-US" sz="1600" b="1" dirty="0" smtClean="0">
-                <a:solidFill>
-                  <a:prstClr val="black"/>
-                </a:solidFill>
-                <a:latin typeface="Arial" pitchFamily="34" charset="0"/>
-                <a:cs typeface="Arial" pitchFamily="34" charset="0"/>
-              </a:rPr>
-              <a:t>Operations:</a:t>
-            </a:r>
-            <a:r>
-              <a:rPr lang="en-US" sz="1600" dirty="0" smtClean="0">
-                <a:solidFill>
-                  <a:prstClr val="black"/>
-                </a:solidFill>
-                <a:latin typeface="Arial" pitchFamily="34" charset="0"/>
-                <a:cs typeface="Arial" pitchFamily="34" charset="0"/>
-              </a:rPr>
-              <a:t> Automate image processing, reduce manual intervention, and enhance workflows</a:t>
-            </a:r>
-            <a:r>
-              <a:rPr lang="en-US" sz="1600" dirty="0" smtClean="0">
-                <a:solidFill>
-                  <a:prstClr val="black"/>
-                </a:solidFill>
-                <a:latin typeface="Arial" pitchFamily="34" charset="0"/>
-                <a:cs typeface="Arial" pitchFamily="34" charset="0"/>
-              </a:rPr>
-              <a:t>.</a:t>
+              <a:t> Automate image processing, reduce manual intervention, and enhance workflows.</a:t>
             </a:r>
           </a:p>
           <a:p>
@@ -8357,7 +7931,17 @@
                 <a:latin typeface="Arial" pitchFamily="34" charset="0"/>
                 <a:cs typeface="Arial" pitchFamily="34" charset="0"/>
               </a:rPr>
-              <a:t>	</a:t>
+              <a:t>	- </a:t>
+            </a:r>
+            <a:r>
+              <a:rPr lang="en-US" sz="1600" b="1" dirty="0" smtClean="0">
+                <a:solidFill>
+                  <a:prstClr val="black"/>
+                </a:solidFill>
+                <a:latin typeface="Arial" pitchFamily="34" charset="0"/>
+                <a:cs typeface="Arial" pitchFamily="34" charset="0"/>
+              </a:rPr>
+              <a:t>Improved Security:</a:t>
             </a:r>
             <a:r>
               <a:rPr lang="en-US" sz="1600" dirty="0" smtClean="0">
@@ -8367,47 +7951,7 @@
                 <a:latin typeface="Arial" pitchFamily="34" charset="0"/>
                 <a:cs typeface="Arial" pitchFamily="34" charset="0"/>
               </a:rPr>
-              <a:t>- </a:t>
-            </a:r>
-            <a:r>
-              <a:rPr lang="en-US" sz="1600" b="1" dirty="0" smtClean="0">
-                <a:solidFill>
-                  <a:prstClr val="black"/>
-                </a:solidFill>
-                <a:latin typeface="Arial" pitchFamily="34" charset="0"/>
-                <a:cs typeface="Arial" pitchFamily="34" charset="0"/>
-              </a:rPr>
-              <a:t>Improved </a:t>
-            </a:r>
-            <a:r>
-              <a:rPr lang="en-US" sz="1600" b="1" dirty="0" smtClean="0">
-                <a:solidFill>
-                  <a:prstClr val="black"/>
-                </a:solidFill>
-                <a:latin typeface="Arial" pitchFamily="34" charset="0"/>
-                <a:cs typeface="Arial" pitchFamily="34" charset="0"/>
-              </a:rPr>
-              <a:t>Security:</a:t>
-            </a:r>
-            <a:r>
-              <a:rPr lang="en-US" sz="1600" dirty="0" smtClean="0">
-                <a:solidFill>
-                  <a:prstClr val="black"/>
-                </a:solidFill>
-                <a:latin typeface="Arial" pitchFamily="34" charset="0"/>
-                <a:cs typeface="Arial" pitchFamily="34" charset="0"/>
-              </a:rPr>
-              <a:t> Real-time threat detection, quick decision making, and enhanced </a:t>
-            </a:r>
-            <a:r>
-              <a:rPr lang="en-US" sz="1600" dirty="0" smtClean="0">
-                <a:solidFill>
-                  <a:prstClr val="black"/>
-                </a:solidFill>
-                <a:latin typeface="Arial" pitchFamily="34" charset="0"/>
-                <a:cs typeface="Arial" pitchFamily="34" charset="0"/>
-              </a:rPr>
-              <a:t>surveillance.</a:t>
+              <a:t> Real-time threat detection, quick decision making, and enhanced surveillance.</a:t>
             </a:r>
           </a:p>
           <a:p>
@@ -8422,7 +7966,17 @@
                 <a:latin typeface="Arial" pitchFamily="34" charset="0"/>
                 <a:cs typeface="Arial" pitchFamily="34" charset="0"/>
               </a:rPr>
-              <a:t>	</a:t>
+              <a:t>	- </a:t>
+            </a:r>
+            <a:r>
+              <a:rPr lang="en-US" sz="1600" b="1" dirty="0" smtClean="0">
+                <a:solidFill>
+                  <a:prstClr val="black"/>
+                </a:solidFill>
+                <a:latin typeface="Arial" pitchFamily="34" charset="0"/>
+                <a:cs typeface="Arial" pitchFamily="34" charset="0"/>
+              </a:rPr>
+              <a:t>Enhanced Customer Support:</a:t>
             </a:r>
             <a:r>
               <a:rPr lang="en-US" sz="1600" dirty="0" smtClean="0">
@@ -8432,47 +7986,7 @@
                 <a:latin typeface="Arial" pitchFamily="34" charset="0"/>
                 <a:cs typeface="Arial" pitchFamily="34" charset="0"/>
               </a:rPr>
-              <a:t>- </a:t>
-            </a:r>
-            <a:r>
-              <a:rPr lang="en-US" sz="1600" b="1" dirty="0" smtClean="0">
-                <a:solidFill>
-                  <a:prstClr val="black"/>
-                </a:solidFill>
-                <a:latin typeface="Arial" pitchFamily="34" charset="0"/>
-                <a:cs typeface="Arial" pitchFamily="34" charset="0"/>
-              </a:rPr>
-              <a:t>Enhanced </a:t>
-            </a:r>
-            <a:r>
-              <a:rPr lang="en-US" sz="1600" b="1" dirty="0" smtClean="0">
-                <a:solidFill>
-                  <a:prstClr val="black"/>
-                </a:solidFill>
-                <a:latin typeface="Arial" pitchFamily="34" charset="0"/>
-                <a:cs typeface="Arial" pitchFamily="34" charset="0"/>
-              </a:rPr>
-              <a:t>Customer Support:</a:t>
-            </a:r>
-            <a:r>
-              <a:rPr lang="en-US" sz="1600" dirty="0" smtClean="0">
-                <a:solidFill>
-                  <a:prstClr val="black"/>
-                </a:solidFill>
-                <a:latin typeface="Arial" pitchFamily="34" charset="0"/>
-                <a:cs typeface="Arial" pitchFamily="34" charset="0"/>
-              </a:rPr>
-              <a:t> Automated equipment diagnostics, real-time assistance, and improved customer satisfaction</a:t>
-            </a:r>
-            <a:r>
-              <a:rPr lang="en-US" sz="1600" dirty="0" smtClean="0">
-                <a:solidFill>
-                  <a:prstClr val="black"/>
-                </a:solidFill>
-                <a:latin typeface="Arial" pitchFamily="34" charset="0"/>
-                <a:cs typeface="Arial" pitchFamily="34" charset="0"/>
-              </a:rPr>
-              <a:t>.</a:t>
+              <a:t> Automated equipment diagnostics, real-time assistance, and improved customer satisfaction.</a:t>
             </a:r>
           </a:p>
           <a:p>
@@ -8487,7 +8001,17 @@
                 <a:latin typeface="Arial" pitchFamily="34" charset="0"/>
                 <a:cs typeface="Arial" pitchFamily="34" charset="0"/>
               </a:rPr>
-              <a:t>	</a:t>
+              <a:t>	- </a:t>
+            </a:r>
+            <a:r>
+              <a:rPr lang="en-US" sz="1600" b="1" dirty="0" smtClean="0">
+                <a:solidFill>
+                  <a:prstClr val="black"/>
+                </a:solidFill>
+                <a:latin typeface="Arial" pitchFamily="34" charset="0"/>
+                <a:cs typeface="Arial" pitchFamily="34" charset="0"/>
+              </a:rPr>
+              <a:t>Training and Maintenance:</a:t>
             </a:r>
             <a:r>
               <a:rPr lang="en-US" sz="1600" dirty="0" smtClean="0">
@@ -8497,47 +8021,7 @@
                 <a:latin typeface="Arial" pitchFamily="34" charset="0"/>
                 <a:cs typeface="Arial" pitchFamily="34" charset="0"/>
               </a:rPr>
-              <a:t>- </a:t>
-            </a:r>
-            <a:r>
-              <a:rPr lang="en-US" sz="1600" b="1" dirty="0" smtClean="0">
-                <a:solidFill>
-                  <a:prstClr val="black"/>
-                </a:solidFill>
-                <a:latin typeface="Arial" pitchFamily="34" charset="0"/>
-                <a:cs typeface="Arial" pitchFamily="34" charset="0"/>
-              </a:rPr>
-              <a:t>Training </a:t>
-            </a:r>
-            <a:r>
-              <a:rPr lang="en-US" sz="1600" b="1" dirty="0" smtClean="0">
-                <a:solidFill>
-                  <a:prstClr val="black"/>
-                </a:solidFill>
-                <a:latin typeface="Arial" pitchFamily="34" charset="0"/>
-                <a:cs typeface="Arial" pitchFamily="34" charset="0"/>
-              </a:rPr>
-              <a:t>and Maintenance:</a:t>
-            </a:r>
-            <a:r>
-              <a:rPr lang="en-US" sz="1600" dirty="0" smtClean="0">
-                <a:solidFill>
-                  <a:prstClr val="black"/>
-                </a:solidFill>
-                <a:latin typeface="Arial" pitchFamily="34" charset="0"/>
-                <a:cs typeface="Arial" pitchFamily="34" charset="0"/>
-              </a:rPr>
-              <a:t> Visual training aid, proactive maintenance, and improved equipment reliability</a:t>
-            </a:r>
-            <a:r>
-              <a:rPr lang="en-US" sz="1600" dirty="0" smtClean="0">
-                <a:solidFill>
-                  <a:prstClr val="black"/>
-                </a:solidFill>
-                <a:latin typeface="Arial" pitchFamily="34" charset="0"/>
-                <a:cs typeface="Arial" pitchFamily="34" charset="0"/>
-              </a:rPr>
-              <a:t>.</a:t>
+              <a:t> Visual training aid, proactive maintenance, and improved equipment reliability.</a:t>
             </a:r>
           </a:p>
           <a:p>
@@ -8554,27 +8038,7 @@
                 <a:latin typeface="Arial" pitchFamily="34" charset="0"/>
                 <a:cs typeface="Arial" pitchFamily="34" charset="0"/>
               </a:rPr>
-              <a:t>Impact </a:t>
-            </a:r>
-            <a:r>
-              <a:rPr lang="en-US" b="1" dirty="0" smtClean="0">
-                <a:solidFill>
-                  <a:prstClr val="black"/>
-                </a:solidFill>
-                <a:latin typeface="Arial" pitchFamily="34" charset="0"/>
-                <a:cs typeface="Arial" pitchFamily="34" charset="0"/>
-              </a:rPr>
-              <a:t>on BEL </a:t>
-            </a:r>
-            <a:r>
-              <a:rPr lang="en-US" b="1" dirty="0" smtClean="0">
-                <a:solidFill>
-                  <a:prstClr val="black"/>
-                </a:solidFill>
-                <a:latin typeface="Arial" pitchFamily="34" charset="0"/>
-                <a:cs typeface="Arial" pitchFamily="34" charset="0"/>
-              </a:rPr>
-              <a:t>Customers1 :</a:t>
+              <a:t>Impact on BEL Customers1 :</a:t>
             </a:r>
           </a:p>
           <a:p>
@@ -8589,47 +8053,17 @@
                 <a:latin typeface="Arial" pitchFamily="34" charset="0"/>
                 <a:cs typeface="Arial" pitchFamily="34" charset="0"/>
               </a:rPr>
-              <a:t>	</a:t>
-            </a:r>
-            <a:r>
-              <a:rPr lang="en-US" sz="1600" b="1" dirty="0" smtClean="0">
+              <a:t>	-  Faster Issue Resolution:</a:t>
+            </a:r>
+            <a:r>
+              <a:rPr lang="en-US" sz="1600" dirty="0" smtClean="0">
                 <a:solidFill>
                   <a:prstClr val="black"/>
                 </a:solidFill>
                 <a:latin typeface="Arial" pitchFamily="34" charset="0"/>
                 <a:cs typeface="Arial" pitchFamily="34" charset="0"/>
               </a:rPr>
-              <a:t>-  </a:t>
-            </a:r>
-            <a:r>
-              <a:rPr lang="en-US" sz="1600" b="1" dirty="0" smtClean="0">
-                <a:solidFill>
-                  <a:prstClr val="black"/>
-                </a:solidFill>
-                <a:latin typeface="Arial" pitchFamily="34" charset="0"/>
-                <a:cs typeface="Arial" pitchFamily="34" charset="0"/>
-              </a:rPr>
-              <a:t>Faster Issue Resolution:</a:t>
-            </a:r>
-            <a:r>
-              <a:rPr lang="en-US" sz="1600" dirty="0" smtClean="0">
-                <a:solidFill>
-                  <a:prstClr val="black"/>
-                </a:solidFill>
-                <a:latin typeface="Arial" pitchFamily="34" charset="0"/>
-                <a:cs typeface="Arial" pitchFamily="34" charset="0"/>
-              </a:rPr>
-              <a:t> Quick diagnosis, efficient support, and reduced downtime</a:t>
-            </a:r>
-            <a:r>
-              <a:rPr lang="en-US" sz="1600" dirty="0" smtClean="0">
-                <a:solidFill>
-                  <a:prstClr val="black"/>
-                </a:solidFill>
-                <a:latin typeface="Arial" pitchFamily="34" charset="0"/>
-                <a:cs typeface="Arial" pitchFamily="34" charset="0"/>
-              </a:rPr>
-              <a:t>.</a:t>
+              <a:t> Quick diagnosis, efficient support, and reduced downtime.</a:t>
             </a:r>
           </a:p>
           <a:p>
@@ -8644,7 +8078,17 @@
                 <a:latin typeface="Arial" pitchFamily="34" charset="0"/>
                 <a:cs typeface="Arial" pitchFamily="34" charset="0"/>
               </a:rPr>
-              <a:t>	</a:t>
+              <a:t>	- </a:t>
+            </a:r>
+            <a:r>
+              <a:rPr lang="en-US" sz="1600" b="1" dirty="0" smtClean="0">
+                <a:solidFill>
+                  <a:prstClr val="black"/>
+                </a:solidFill>
+                <a:latin typeface="Arial" pitchFamily="34" charset="0"/>
+                <a:cs typeface="Arial" pitchFamily="34" charset="0"/>
+              </a:rPr>
+              <a:t>Enhanced Product Security:</a:t>
             </a:r>
             <a:r>
               <a:rPr lang="en-US" sz="1600" dirty="0" smtClean="0">
@@ -8654,47 +8098,7 @@
                 <a:latin typeface="Arial" pitchFamily="34" charset="0"/>
                 <a:cs typeface="Arial" pitchFamily="34" charset="0"/>
               </a:rPr>
-              <a:t>- </a:t>
-            </a:r>
-            <a:r>
-              <a:rPr lang="en-US" sz="1600" b="1" dirty="0" smtClean="0">
-                <a:solidFill>
-                  <a:prstClr val="black"/>
-                </a:solidFill>
-                <a:latin typeface="Arial" pitchFamily="34" charset="0"/>
-                <a:cs typeface="Arial" pitchFamily="34" charset="0"/>
-              </a:rPr>
-              <a:t>Enhanced </a:t>
-            </a:r>
-            <a:r>
-              <a:rPr lang="en-US" sz="1600" b="1" dirty="0" smtClean="0">
-                <a:solidFill>
-                  <a:prstClr val="black"/>
-                </a:solidFill>
-                <a:latin typeface="Arial" pitchFamily="34" charset="0"/>
-                <a:cs typeface="Arial" pitchFamily="34" charset="0"/>
-              </a:rPr>
-              <a:t>Product Security:</a:t>
-            </a:r>
-            <a:r>
-              <a:rPr lang="en-US" sz="1600" dirty="0" smtClean="0">
-                <a:solidFill>
-                  <a:prstClr val="black"/>
-                </a:solidFill>
-                <a:latin typeface="Arial" pitchFamily="34" charset="0"/>
-                <a:cs typeface="Arial" pitchFamily="34" charset="0"/>
-              </a:rPr>
-              <a:t> Product integrity, surveillance feedback, and quality assurance</a:t>
-            </a:r>
-            <a:r>
-              <a:rPr lang="en-US" sz="1600" dirty="0" smtClean="0">
-                <a:solidFill>
-                  <a:prstClr val="black"/>
-                </a:solidFill>
-                <a:latin typeface="Arial" pitchFamily="34" charset="0"/>
-                <a:cs typeface="Arial" pitchFamily="34" charset="0"/>
-              </a:rPr>
-              <a:t>.</a:t>
+              <a:t> Product integrity, surveillance feedback, and quality assurance.</a:t>
             </a:r>
           </a:p>
           <a:p>
@@ -8709,7 +8113,17 @@
                 <a:latin typeface="Arial" pitchFamily="34" charset="0"/>
                 <a:cs typeface="Arial" pitchFamily="34" charset="0"/>
               </a:rPr>
-              <a:t>	</a:t>
+              <a:t>	- </a:t>
+            </a:r>
+            <a:r>
+              <a:rPr lang="en-US" sz="1600" b="1" dirty="0" smtClean="0">
+                <a:solidFill>
+                  <a:prstClr val="black"/>
+                </a:solidFill>
+                <a:latin typeface="Arial" pitchFamily="34" charset="0"/>
+                <a:cs typeface="Arial" pitchFamily="34" charset="0"/>
+              </a:rPr>
+              <a:t>Improved User Experience:</a:t>
             </a:r>
             <a:r>
               <a:rPr lang="en-US" sz="1600" dirty="0" smtClean="0">
@@ -8719,47 +8133,7 @@
                 <a:latin typeface="Arial" pitchFamily="34" charset="0"/>
                 <a:cs typeface="Arial" pitchFamily="34" charset="0"/>
               </a:rPr>
-              <a:t>- </a:t>
-            </a:r>
-            <a:r>
-              <a:rPr lang="en-US" sz="1600" b="1" dirty="0" smtClean="0">
-                <a:solidFill>
-                  <a:prstClr val="black"/>
-                </a:solidFill>
-                <a:latin typeface="Arial" pitchFamily="34" charset="0"/>
-                <a:cs typeface="Arial" pitchFamily="34" charset="0"/>
-              </a:rPr>
-              <a:t>Improved </a:t>
-            </a:r>
-            <a:r>
-              <a:rPr lang="en-US" sz="1600" b="1" dirty="0" smtClean="0">
-                <a:solidFill>
-                  <a:prstClr val="black"/>
-                </a:solidFill>
-                <a:latin typeface="Arial" pitchFamily="34" charset="0"/>
-                <a:cs typeface="Arial" pitchFamily="34" charset="0"/>
-              </a:rPr>
-              <a:t>User Experience:</a:t>
-            </a:r>
-            <a:r>
-              <a:rPr lang="en-US" sz="1600" dirty="0" smtClean="0">
-                <a:solidFill>
-                  <a:prstClr val="black"/>
-                </a:solidFill>
-                <a:latin typeface="Arial" pitchFamily="34" charset="0"/>
-                <a:cs typeface="Arial" pitchFamily="34" charset="0"/>
-              </a:rPr>
-              <a:t> Ease of use, 24/7 assistance, and continuous support</a:t>
-            </a:r>
-            <a:r>
-              <a:rPr lang="en-US" sz="1600" dirty="0" smtClean="0">
-                <a:solidFill>
-                  <a:prstClr val="black"/>
-                </a:solidFill>
-                <a:latin typeface="Arial" pitchFamily="34" charset="0"/>
-                <a:cs typeface="Arial" pitchFamily="34" charset="0"/>
-              </a:rPr>
-              <a:t>.</a:t>
+              <a:t> Ease of use, 24/7 assistance, and continuous support.</a:t>
             </a:r>
           </a:p>
           <a:p>
@@ -8774,7 +8148,17 @@
                 <a:latin typeface="Arial" pitchFamily="34" charset="0"/>
                 <a:cs typeface="Arial" pitchFamily="34" charset="0"/>
               </a:rPr>
-              <a:t>	</a:t>
+              <a:t>	- </a:t>
+            </a:r>
+            <a:r>
+              <a:rPr lang="en-US" sz="1600" b="1" dirty="0" smtClean="0">
+                <a:solidFill>
+                  <a:prstClr val="black"/>
+                </a:solidFill>
+                <a:latin typeface="Arial" pitchFamily="34" charset="0"/>
+                <a:cs typeface="Arial" pitchFamily="34" charset="0"/>
+              </a:rPr>
+              <a:t>Real-Time Monitoring:</a:t>
             </a:r>
             <a:r>
               <a:rPr lang="en-US" sz="1600" dirty="0" smtClean="0">
@@ -8784,47 +8168,7 @@
                 <a:latin typeface="Arial" pitchFamily="34" charset="0"/>
                 <a:cs typeface="Arial" pitchFamily="34" charset="0"/>
               </a:rPr>
-              <a:t>- </a:t>
-            </a:r>
-            <a:r>
-              <a:rPr lang="en-US" sz="1600" b="1" dirty="0" smtClean="0">
-                <a:solidFill>
-                  <a:prstClr val="black"/>
-                </a:solidFill>
-                <a:latin typeface="Arial" pitchFamily="34" charset="0"/>
-                <a:cs typeface="Arial" pitchFamily="34" charset="0"/>
-              </a:rPr>
-              <a:t>Real-Time </a:t>
-            </a:r>
-            <a:r>
-              <a:rPr lang="en-US" sz="1600" b="1" dirty="0" smtClean="0">
-                <a:solidFill>
-                  <a:prstClr val="black"/>
-                </a:solidFill>
-                <a:latin typeface="Arial" pitchFamily="34" charset="0"/>
-                <a:cs typeface="Arial" pitchFamily="34" charset="0"/>
-              </a:rPr>
-              <a:t>Monitoring:</a:t>
-            </a:r>
-            <a:r>
-              <a:rPr lang="en-US" sz="1600" dirty="0" smtClean="0">
-                <a:solidFill>
-                  <a:prstClr val="black"/>
-                </a:solidFill>
-                <a:latin typeface="Arial" pitchFamily="34" charset="0"/>
-                <a:cs typeface="Arial" pitchFamily="34" charset="0"/>
-              </a:rPr>
-              <a:t> Critical infrastructure monitoring, added layer of defense, and national security</a:t>
-            </a:r>
-            <a:r>
-              <a:rPr lang="en-US" sz="1600" dirty="0" smtClean="0">
-                <a:solidFill>
-                  <a:prstClr val="black"/>
-                </a:solidFill>
-                <a:latin typeface="Arial" pitchFamily="34" charset="0"/>
-                <a:cs typeface="Arial" pitchFamily="34" charset="0"/>
-              </a:rPr>
-              <a:t>.</a:t>
+              <a:t> Critical infrastructure monitoring, added layer of defense, and national security.</a:t>
             </a:r>
           </a:p>
           <a:p>
@@ -8841,27 +8185,7 @@
                 <a:latin typeface="Arial" pitchFamily="34" charset="0"/>
                 <a:cs typeface="Arial" pitchFamily="34" charset="0"/>
               </a:rPr>
-              <a:t>Long-Term </a:t>
-            </a:r>
-            <a:r>
-              <a:rPr lang="en-US" b="1" dirty="0" smtClean="0">
-                <a:solidFill>
-                  <a:prstClr val="black"/>
-                </a:solidFill>
-                <a:latin typeface="Arial" pitchFamily="34" charset="0"/>
-                <a:cs typeface="Arial" pitchFamily="34" charset="0"/>
-              </a:rPr>
-              <a:t>Strategic </a:t>
-            </a:r>
-            <a:r>
-              <a:rPr lang="en-US" b="1" dirty="0" smtClean="0">
-                <a:solidFill>
-                  <a:prstClr val="black"/>
-                </a:solidFill>
-                <a:latin typeface="Arial" pitchFamily="34" charset="0"/>
-                <a:cs typeface="Arial" pitchFamily="34" charset="0"/>
-              </a:rPr>
-              <a:t>Impact :</a:t>
+              <a:t>Long-Term Strategic Impact :</a:t>
             </a:r>
             <a:r>
               <a:rPr lang="en-US" sz="1600" dirty="0" smtClean="0">
@@ -8886,7 +8210,17 @@
                 <a:latin typeface="Arial" pitchFamily="34" charset="0"/>
                 <a:cs typeface="Arial" pitchFamily="34" charset="0"/>
               </a:rPr>
-              <a:t>	</a:t>
+              <a:t>	- </a:t>
+            </a:r>
+            <a:r>
+              <a:rPr lang="en-US" sz="1600" b="1" dirty="0" smtClean="0">
+                <a:solidFill>
+                  <a:prstClr val="black"/>
+                </a:solidFill>
+                <a:latin typeface="Arial" pitchFamily="34" charset="0"/>
+                <a:cs typeface="Arial" pitchFamily="34" charset="0"/>
+              </a:rPr>
+              <a:t>Scalability:</a:t>
             </a:r>
             <a:r>
               <a:rPr lang="en-US" sz="1600" dirty="0" smtClean="0">
@@ -8896,47 +8230,7 @@
                 <a:latin typeface="Arial" pitchFamily="34" charset="0"/>
                 <a:cs typeface="Arial" pitchFamily="34" charset="0"/>
               </a:rPr>
-              <a:t>- </a:t>
-            </a:r>
-            <a:r>
-              <a:rPr lang="en-US" sz="1600" b="1" dirty="0" smtClean="0">
-                <a:solidFill>
-                  <a:prstClr val="black"/>
-                </a:solidFill>
-                <a:latin typeface="Arial" pitchFamily="34" charset="0"/>
-                <a:cs typeface="Arial" pitchFamily="34" charset="0"/>
-              </a:rPr>
-              <a:t>Scalability</a:t>
-            </a:r>
-            <a:r>
-              <a:rPr lang="en-US" sz="1600" b="1" dirty="0" smtClean="0">
-                <a:solidFill>
-                  <a:prstClr val="black"/>
-                </a:solidFill>
-                <a:latin typeface="Arial" pitchFamily="34" charset="0"/>
-                <a:cs typeface="Arial" pitchFamily="34" charset="0"/>
-              </a:rPr>
-              <a:t>:</a:t>
-            </a:r>
-            <a:r>
-              <a:rPr lang="en-US" sz="1600" dirty="0" smtClean="0">
-                <a:solidFill>
-                  <a:prstClr val="black"/>
-                </a:solidFill>
-                <a:latin typeface="Arial" pitchFamily="34" charset="0"/>
-                <a:cs typeface="Arial" pitchFamily="34" charset="0"/>
-              </a:rPr>
-              <a:t> Expand applications in various sectors</a:t>
-            </a:r>
-            <a:r>
-              <a:rPr lang="en-US" sz="1600" dirty="0" smtClean="0">
-                <a:solidFill>
-                  <a:prstClr val="black"/>
-                </a:solidFill>
-                <a:latin typeface="Arial" pitchFamily="34" charset="0"/>
-                <a:cs typeface="Arial" pitchFamily="34" charset="0"/>
-              </a:rPr>
-              <a:t>.</a:t>
+              <a:t> Expand applications in various sectors.</a:t>
             </a:r>
           </a:p>
           <a:p>
@@ -8951,7 +8245,17 @@
                 <a:latin typeface="Arial" pitchFamily="34" charset="0"/>
                 <a:cs typeface="Arial" pitchFamily="34" charset="0"/>
               </a:rPr>
-              <a:t>	</a:t>
+              <a:t>	- </a:t>
+            </a:r>
+            <a:r>
+              <a:rPr lang="en-US" sz="1600" b="1" dirty="0" smtClean="0">
+                <a:solidFill>
+                  <a:prstClr val="black"/>
+                </a:solidFill>
+                <a:latin typeface="Arial" pitchFamily="34" charset="0"/>
+                <a:cs typeface="Arial" pitchFamily="34" charset="0"/>
+              </a:rPr>
+              <a:t>Data-Driven Insights:</a:t>
             </a:r>
             <a:r>
               <a:rPr lang="en-US" sz="1600" dirty="0" smtClean="0">
@@ -8961,47 +8265,7 @@
                 <a:latin typeface="Arial" pitchFamily="34" charset="0"/>
                 <a:cs typeface="Arial" pitchFamily="34" charset="0"/>
               </a:rPr>
-              <a:t>- </a:t>
-            </a:r>
-            <a:r>
-              <a:rPr lang="en-US" sz="1600" b="1" dirty="0" smtClean="0">
-                <a:solidFill>
-                  <a:prstClr val="black"/>
-                </a:solidFill>
-                <a:latin typeface="Arial" pitchFamily="34" charset="0"/>
-                <a:cs typeface="Arial" pitchFamily="34" charset="0"/>
-              </a:rPr>
-              <a:t>Data-Driven </a:t>
-            </a:r>
-            <a:r>
-              <a:rPr lang="en-US" sz="1600" b="1" dirty="0" smtClean="0">
-                <a:solidFill>
-                  <a:prstClr val="black"/>
-                </a:solidFill>
-                <a:latin typeface="Arial" pitchFamily="34" charset="0"/>
-                <a:cs typeface="Arial" pitchFamily="34" charset="0"/>
-              </a:rPr>
-              <a:t>Insights:</a:t>
-            </a:r>
-            <a:r>
-              <a:rPr lang="en-US" sz="1600" dirty="0" smtClean="0">
-                <a:solidFill>
-                  <a:prstClr val="black"/>
-                </a:solidFill>
-                <a:latin typeface="Arial" pitchFamily="34" charset="0"/>
-                <a:cs typeface="Arial" pitchFamily="34" charset="0"/>
-              </a:rPr>
-              <a:t> Improve products, optimize support, and enhance operational efficiency</a:t>
-            </a:r>
-            <a:r>
-              <a:rPr lang="en-US" sz="1600" dirty="0" smtClean="0">
-                <a:solidFill>
-                  <a:prstClr val="black"/>
-                </a:solidFill>
-                <a:latin typeface="Arial" pitchFamily="34" charset="0"/>
-                <a:cs typeface="Arial" pitchFamily="34" charset="0"/>
-              </a:rPr>
-              <a:t>.</a:t>
+              <a:t> Improve products, optimize support, and enhance operational efficiency.</a:t>
             </a:r>
           </a:p>
           <a:p>
@@ -9016,7 +8280,17 @@
                 <a:latin typeface="Arial" pitchFamily="34" charset="0"/>
                 <a:cs typeface="Arial" pitchFamily="34" charset="0"/>
               </a:rPr>
-              <a:t>	</a:t>
+              <a:t>	- </a:t>
+            </a:r>
+            <a:r>
+              <a:rPr lang="en-US" sz="1600" b="1" dirty="0" smtClean="0">
+                <a:solidFill>
+                  <a:prstClr val="black"/>
+                </a:solidFill>
+                <a:latin typeface="Arial" pitchFamily="34" charset="0"/>
+                <a:cs typeface="Arial" pitchFamily="34" charset="0"/>
+              </a:rPr>
+              <a:t>National Security:</a:t>
             </a:r>
             <a:r>
               <a:rPr lang="en-US" sz="1600" dirty="0" smtClean="0">
@@ -9026,57 +8300,7 @@
                 <a:latin typeface="Arial" pitchFamily="34" charset="0"/>
                 <a:cs typeface="Arial" pitchFamily="34" charset="0"/>
               </a:rPr>
-              <a:t>- </a:t>
-            </a:r>
-            <a:r>
-              <a:rPr lang="en-US" sz="1600" b="1" dirty="0" smtClean="0">
-                <a:solidFill>
-                  <a:prstClr val="black"/>
-                </a:solidFill>
-                <a:latin typeface="Arial" pitchFamily="34" charset="0"/>
-                <a:cs typeface="Arial" pitchFamily="34" charset="0"/>
-              </a:rPr>
-              <a:t>National </a:t>
-            </a:r>
-            <a:r>
-              <a:rPr lang="en-US" sz="1600" b="1" dirty="0" smtClean="0">
-                <a:solidFill>
-                  <a:prstClr val="black"/>
-                </a:solidFill>
-                <a:latin typeface="Arial" pitchFamily="34" charset="0"/>
-                <a:cs typeface="Arial" pitchFamily="34" charset="0"/>
-              </a:rPr>
-              <a:t>Security:</a:t>
-            </a:r>
-            <a:r>
-              <a:rPr lang="en-US" sz="1600" dirty="0" smtClean="0">
-                <a:solidFill>
-                  <a:prstClr val="black"/>
-                </a:solidFill>
-                <a:latin typeface="Arial" pitchFamily="34" charset="0"/>
-                <a:cs typeface="Arial" pitchFamily="34" charset="0"/>
-              </a:rPr>
-              <a:t> Bolster national security initiatives with advanced image recognition and NLP </a:t>
-            </a:r>
-            <a:r>
-              <a:rPr lang="en-US" sz="1600" dirty="0" smtClean="0">
-                <a:solidFill>
-                  <a:prstClr val="black"/>
-                </a:solidFill>
-                <a:latin typeface="Arial" pitchFamily="34" charset="0"/>
-                <a:cs typeface="Arial" pitchFamily="34" charset="0"/>
-              </a:rPr>
-              <a:t>	capabilities</a:t>
-            </a:r>
-            <a:r>
-              <a:rPr lang="en-US" sz="1600" dirty="0" smtClean="0">
-                <a:solidFill>
-                  <a:prstClr val="black"/>
-                </a:solidFill>
-                <a:latin typeface="Arial" pitchFamily="34" charset="0"/>
-                <a:cs typeface="Arial" pitchFamily="34" charset="0"/>
-              </a:rPr>
-              <a:t>.</a:t>
+              <a:t> Bolster national security initiatives with advanced image recognition and NLP 	capabilities.</a:t>
             </a:r>
             <a:endParaRPr lang="en-US" sz="1600" dirty="0">
               <a:solidFill>
@@ -9274,10 +8498,10 @@
           <p:cNvPr id="12" name="Oval 11" descr="Your startup LOGO">
             <a:extLst>
               <a:ext uri="{FF2B5EF4-FFF2-40B4-BE49-F238E27FC236}">
-                <a16:creationId xmlns:a16="http://schemas.microsoft.com/office/drawing/2014/main" xmlns="" id="{5DBCE864-823D-4A13-9607-5DA1F0ED5FB8}"/>
+                <a16:creationId xmlns="" xmlns:a16="http://schemas.microsoft.com/office/drawing/2014/main" id="{5DBCE864-823D-4A13-9607-5DA1F0ED5FB8}"/>
               </a:ext>
               <a:ext uri="{C183D7F6-B498-43B3-948B-1728B52AA6E4}">
-                <adec:decorative xmlns="" xmlns:adec="http://schemas.microsoft.com/office/drawing/2017/decorative" val="0"/>
+                <adec:decorative xmlns:adec="http://schemas.microsoft.com/office/drawing/2017/decorative" xmlns="" val="0"/>
               </a:ext>
             </a:extLst>
           </p:cNvPr>
@@ -9323,7 +8547,7 @@
     </p:spTree>
     <p:extLst>
       <p:ext uri="{BB962C8B-B14F-4D97-AF65-F5344CB8AC3E}">
-        <p14:creationId xmlns:p14="http://schemas.microsoft.com/office/powerpoint/2010/main" xmlns="" val="2997144140"/>
+        <p14:creationId xmlns="" xmlns:p14="http://schemas.microsoft.com/office/powerpoint/2010/main" val="2997144140"/>
       </p:ext>
     </p:extLst>
   </p:cSld>
@@ -9362,7 +8586,7 @@
           <p:cNvPr id="10" name="Rectangle 9">
             <a:extLst>
               <a:ext uri="{FF2B5EF4-FFF2-40B4-BE49-F238E27FC236}">
-                <a16:creationId xmlns:a16="http://schemas.microsoft.com/office/drawing/2014/main" xmlns="" id="{AD4F69D3-EEB0-4C4C-9434-B9960FB5854C}"/>
+                <a16:creationId xmlns="" xmlns:a16="http://schemas.microsoft.com/office/drawing/2014/main" id="{AD4F69D3-EEB0-4C4C-9434-B9960FB5854C}"/>
               </a:ext>
             </a:extLst>
           </p:cNvPr>
@@ -9458,15 +8682,7 @@
                 <a:ea typeface="ＭＳ Ｐゴシック" pitchFamily="1" charset="-128"/>
                 <a:cs typeface="Times New Roman" panose="02020603050405020304" pitchFamily="18" charset="0"/>
               </a:rPr>
-              <a:t>CURRENT PROGRESS &amp;</a:t>
-            </a:r>
-            <a:r>
-              <a:rPr lang="en-US" sz="2800" b="1" dirty="0" smtClean="0">
-                <a:latin typeface="Times New Roman" panose="02020603050405020304" pitchFamily="18" charset="0"/>
-                <a:ea typeface="ＭＳ Ｐゴシック" pitchFamily="1" charset="-128"/>
-                <a:cs typeface="Times New Roman" panose="02020603050405020304" pitchFamily="18" charset="0"/>
-              </a:rPr>
-              <a:t> REFERENCES</a:t>
+              <a:t>CURRENT PROGRESS &amp; REFERENCES</a:t>
             </a:r>
             <a:endParaRPr lang="en-US" sz="2800" b="1" dirty="0">
               <a:latin typeface="Times New Roman" panose="02020603050405020304" pitchFamily="18" charset="0"/>
@@ -9776,10 +8992,10 @@
           <p:cNvPr id="9" name="Oval 8" descr="Your startup LOGO">
             <a:extLst>
               <a:ext uri="{FF2B5EF4-FFF2-40B4-BE49-F238E27FC236}">
-                <a16:creationId xmlns:a16="http://schemas.microsoft.com/office/drawing/2014/main" xmlns="" id="{5DBCE864-823D-4A13-9607-5DA1F0ED5FB8}"/>
+                <a16:creationId xmlns="" xmlns:a16="http://schemas.microsoft.com/office/drawing/2014/main" id="{5DBCE864-823D-4A13-9607-5DA1F0ED5FB8}"/>
               </a:ext>
               <a:ext uri="{C183D7F6-B498-43B3-948B-1728B52AA6E4}">
-                <adec:decorative xmlns="" xmlns:adec="http://schemas.microsoft.com/office/drawing/2017/decorative" val="0"/>
+                <adec:decorative xmlns:adec="http://schemas.microsoft.com/office/drawing/2017/decorative" xmlns="" val="0"/>
               </a:ext>
             </a:extLst>
           </p:cNvPr>
@@ -9965,7 +9181,7 @@
     </p:spTree>
     <p:extLst>
       <p:ext uri="{BB962C8B-B14F-4D97-AF65-F5344CB8AC3E}">
-        <p14:creationId xmlns:p14="http://schemas.microsoft.com/office/powerpoint/2010/main" xmlns="" val="3916788613"/>
+        <p14:creationId xmlns="" xmlns:p14="http://schemas.microsoft.com/office/powerpoint/2010/main" val="3916788613"/>
       </p:ext>
     </p:extLst>
   </p:cSld>

</xml_diff>